<commit_message>
Adicionados execícios de API
</commit_message>
<xml_diff>
--- a/UC4-BackEnd/PPTs/4.1-API.pptx
+++ b/UC4-BackEnd/PPTs/4.1-API.pptx
@@ -11,8 +11,8 @@
     <p:sldId id="260" r:id="rId5"/>
     <p:sldId id="259" r:id="rId6"/>
     <p:sldId id="262" r:id="rId7"/>
-    <p:sldId id="263" r:id="rId8"/>
-    <p:sldId id="266" r:id="rId9"/>
+    <p:sldId id="266" r:id="rId8"/>
+    <p:sldId id="263" r:id="rId9"/>
     <p:sldId id="265" r:id="rId10"/>
     <p:sldId id="264" r:id="rId11"/>
     <p:sldId id="267" r:id="rId12"/>
@@ -118,7 +118,33 @@
       </a:defRPr>
     </a:lvl9pPr>
   </p:defaultTextStyle>
+  <p:extLst>
+    <p:ext uri="{EFAFB233-063F-42B5-8137-9DF3F51BA10A}">
+      <p15:sldGuideLst xmlns:p15="http://schemas.microsoft.com/office/powerpoint/2012/main"/>
+    </p:ext>
+  </p:extLst>
 </p:presentation>
+</file>
+
+<file path=ppt/changesInfos/changesInfo1.xml><?xml version="1.0" encoding="utf-8"?>
+<pc:chgInfo xmlns:a="http://schemas.openxmlformats.org/drawingml/2006/main" xmlns:r="http://schemas.openxmlformats.org/officeDocument/2006/relationships" xmlns:ac="http://schemas.microsoft.com/office/drawing/2013/main/command" xmlns:pc="http://schemas.microsoft.com/office/powerpoint/2013/main/command">
+  <pc:docChgLst>
+    <pc:chgData name="Pablo Garcia" userId="45d086511dae29ac" providerId="LiveId" clId="{C83AD7C8-9CFD-4390-BBAE-FFE24D62C95B}"/>
+    <pc:docChg chg="modSld sldOrd">
+      <pc:chgData name="Pablo Garcia" userId="45d086511dae29ac" providerId="LiveId" clId="{C83AD7C8-9CFD-4390-BBAE-FFE24D62C95B}" dt="2024-11-26T16:38:08.778" v="1"/>
+      <pc:docMkLst>
+        <pc:docMk/>
+      </pc:docMkLst>
+      <pc:sldChg chg="ord">
+        <pc:chgData name="Pablo Garcia" userId="45d086511dae29ac" providerId="LiveId" clId="{C83AD7C8-9CFD-4390-BBAE-FFE24D62C95B}" dt="2024-11-26T16:38:08.778" v="1"/>
+        <pc:sldMkLst>
+          <pc:docMk/>
+          <pc:sldMk cId="1190250081" sldId="263"/>
+        </pc:sldMkLst>
+      </pc:sldChg>
+    </pc:docChg>
+  </pc:docChgLst>
+</pc:chgInfo>
 </file>
 
 <file path=ppt/slideLayouts/slideLayout1.xml><?xml version="1.0" encoding="utf-8"?>
@@ -3550,13 +3576,13 @@
   <p:clrMapOvr>
     <a:masterClrMapping/>
   </p:clrMapOvr>
-  <mc:AlternateContent xmlns:mc="http://schemas.openxmlformats.org/markup-compatibility/2006">
-    <mc:Choice xmlns:p159="http://schemas.microsoft.com/office/powerpoint/2015/09/main" Requires="p159">
+  <mc:AlternateContent xmlns:mc="http://schemas.openxmlformats.org/markup-compatibility/2006" xmlns:p159="http://schemas.microsoft.com/office/powerpoint/2015/09/main">
+    <mc:Choice Requires="p159">
       <p:transition xmlns:p14="http://schemas.microsoft.com/office/powerpoint/2010/main" spd="slow" p14:dur="2000">
         <p159:morph option="byObject"/>
       </p:transition>
     </mc:Choice>
-    <mc:Fallback>
+    <mc:Fallback xmlns="">
       <p:transition spd="slow">
         <p:fade/>
       </p:transition>
@@ -4271,13 +4297,13 @@
   <p:clrMapOvr>
     <a:masterClrMapping/>
   </p:clrMapOvr>
-  <mc:AlternateContent xmlns:mc="http://schemas.openxmlformats.org/markup-compatibility/2006">
-    <mc:Choice xmlns:p159="http://schemas.microsoft.com/office/powerpoint/2015/09/main" Requires="p159">
+  <mc:AlternateContent xmlns:mc="http://schemas.openxmlformats.org/markup-compatibility/2006" xmlns:p159="http://schemas.microsoft.com/office/powerpoint/2015/09/main">
+    <mc:Choice Requires="p159">
       <p:transition xmlns:p14="http://schemas.microsoft.com/office/powerpoint/2010/main" spd="slow" p14:dur="2000">
         <p159:morph option="byObject"/>
       </p:transition>
     </mc:Choice>
-    <mc:Fallback>
+    <mc:Fallback xmlns="">
       <p:transition spd="slow">
         <p:fade/>
       </p:transition>
@@ -4492,13 +4518,13 @@
   <p:clrMapOvr>
     <a:masterClrMapping/>
   </p:clrMapOvr>
-  <mc:AlternateContent xmlns:mc="http://schemas.openxmlformats.org/markup-compatibility/2006">
-    <mc:Choice xmlns:p159="http://schemas.microsoft.com/office/powerpoint/2015/09/main" Requires="p159">
+  <mc:AlternateContent xmlns:mc="http://schemas.openxmlformats.org/markup-compatibility/2006" xmlns:p159="http://schemas.microsoft.com/office/powerpoint/2015/09/main">
+    <mc:Choice Requires="p159">
       <p:transition xmlns:p14="http://schemas.microsoft.com/office/powerpoint/2010/main" spd="slow" p14:dur="2000">
         <p159:morph option="byObject"/>
       </p:transition>
     </mc:Choice>
-    <mc:Fallback>
+    <mc:Fallback xmlns="">
       <p:transition spd="slow">
         <p:fade/>
       </p:transition>
@@ -4713,13 +4739,13 @@
   <p:clrMapOvr>
     <a:masterClrMapping/>
   </p:clrMapOvr>
-  <mc:AlternateContent xmlns:mc="http://schemas.openxmlformats.org/markup-compatibility/2006">
-    <mc:Choice xmlns:p159="http://schemas.microsoft.com/office/powerpoint/2015/09/main" Requires="p159">
+  <mc:AlternateContent xmlns:mc="http://schemas.openxmlformats.org/markup-compatibility/2006" xmlns:p159="http://schemas.microsoft.com/office/powerpoint/2015/09/main">
+    <mc:Choice Requires="p159">
       <p:transition xmlns:p14="http://schemas.microsoft.com/office/powerpoint/2010/main" spd="slow" p14:dur="2000">
         <p159:morph option="byObject"/>
       </p:transition>
     </mc:Choice>
-    <mc:Fallback>
+    <mc:Fallback xmlns="">
       <p:transition spd="slow">
         <p:fade/>
       </p:transition>
@@ -4934,13 +4960,13 @@
   <p:clrMapOvr>
     <a:masterClrMapping/>
   </p:clrMapOvr>
-  <mc:AlternateContent xmlns:mc="http://schemas.openxmlformats.org/markup-compatibility/2006">
-    <mc:Choice xmlns:p159="http://schemas.microsoft.com/office/powerpoint/2015/09/main" Requires="p159">
+  <mc:AlternateContent xmlns:mc="http://schemas.openxmlformats.org/markup-compatibility/2006" xmlns:p159="http://schemas.microsoft.com/office/powerpoint/2015/09/main">
+    <mc:Choice Requires="p159">
       <p:transition xmlns:p14="http://schemas.microsoft.com/office/powerpoint/2010/main" spd="slow" p14:dur="2000">
         <p159:morph option="byObject"/>
       </p:transition>
     </mc:Choice>
-    <mc:Fallback>
+    <mc:Fallback xmlns="">
       <p:transition spd="slow">
         <p:fade/>
       </p:transition>
@@ -5186,13 +5212,13 @@
   <p:clrMapOvr>
     <a:masterClrMapping/>
   </p:clrMapOvr>
-  <mc:AlternateContent xmlns:mc="http://schemas.openxmlformats.org/markup-compatibility/2006">
-    <mc:Choice xmlns:p159="http://schemas.microsoft.com/office/powerpoint/2015/09/main" Requires="p159">
+  <mc:AlternateContent xmlns:mc="http://schemas.openxmlformats.org/markup-compatibility/2006" xmlns:p159="http://schemas.microsoft.com/office/powerpoint/2015/09/main">
+    <mc:Choice Requires="p159">
       <p:transition xmlns:p14="http://schemas.microsoft.com/office/powerpoint/2010/main" spd="slow" p14:dur="2000">
         <p159:morph option="byObject"/>
       </p:transition>
     </mc:Choice>
-    <mc:Fallback>
+    <mc:Fallback xmlns="">
       <p:transition spd="slow">
         <p:fade/>
       </p:transition>
@@ -5408,13 +5434,13 @@
   <p:clrMapOvr>
     <a:masterClrMapping/>
   </p:clrMapOvr>
-  <mc:AlternateContent xmlns:mc="http://schemas.openxmlformats.org/markup-compatibility/2006">
-    <mc:Choice xmlns:p159="http://schemas.microsoft.com/office/powerpoint/2015/09/main" Requires="p159">
+  <mc:AlternateContent xmlns:mc="http://schemas.openxmlformats.org/markup-compatibility/2006" xmlns:p159="http://schemas.microsoft.com/office/powerpoint/2015/09/main">
+    <mc:Choice Requires="p159">
       <p:transition xmlns:p14="http://schemas.microsoft.com/office/powerpoint/2010/main" spd="slow" p14:dur="2000">
         <p159:morph option="byObject"/>
       </p:transition>
     </mc:Choice>
-    <mc:Fallback>
+    <mc:Fallback xmlns="">
       <p:transition spd="slow">
         <p:fade/>
       </p:transition>
@@ -5727,13 +5753,13 @@
   <p:clrMapOvr>
     <a:masterClrMapping/>
   </p:clrMapOvr>
-  <mc:AlternateContent xmlns:mc="http://schemas.openxmlformats.org/markup-compatibility/2006">
-    <mc:Choice xmlns:p159="http://schemas.microsoft.com/office/powerpoint/2015/09/main" Requires="p159">
+  <mc:AlternateContent xmlns:mc="http://schemas.openxmlformats.org/markup-compatibility/2006" xmlns:p159="http://schemas.microsoft.com/office/powerpoint/2015/09/main">
+    <mc:Choice Requires="p159">
       <p:transition xmlns:p14="http://schemas.microsoft.com/office/powerpoint/2010/main" spd="slow" p14:dur="2000">
         <p159:morph option="byObject"/>
       </p:transition>
     </mc:Choice>
-    <mc:Fallback>
+    <mc:Fallback xmlns="">
       <p:transition spd="slow">
         <p:fade/>
       </p:transition>
@@ -6303,13 +6329,13 @@
   <p:clrMapOvr>
     <a:masterClrMapping/>
   </p:clrMapOvr>
-  <mc:AlternateContent xmlns:mc="http://schemas.openxmlformats.org/markup-compatibility/2006">
-    <mc:Choice xmlns:p159="http://schemas.microsoft.com/office/powerpoint/2015/09/main" Requires="p159">
+  <mc:AlternateContent xmlns:mc="http://schemas.openxmlformats.org/markup-compatibility/2006" xmlns:p159="http://schemas.microsoft.com/office/powerpoint/2015/09/main">
+    <mc:Choice Requires="p159">
       <p:transition xmlns:p14="http://schemas.microsoft.com/office/powerpoint/2010/main" spd="slow" p14:dur="2000">
         <p159:morph option="byObject"/>
       </p:transition>
     </mc:Choice>
-    <mc:Fallback>
+    <mc:Fallback xmlns="">
       <p:transition spd="slow">
         <p:fade/>
       </p:transition>
@@ -6794,13 +6820,13 @@
   <p:clrMapOvr>
     <a:masterClrMapping/>
   </p:clrMapOvr>
-  <mc:AlternateContent xmlns:mc="http://schemas.openxmlformats.org/markup-compatibility/2006">
-    <mc:Choice xmlns:p159="http://schemas.microsoft.com/office/powerpoint/2015/09/main" Requires="p159">
+  <mc:AlternateContent xmlns:mc="http://schemas.openxmlformats.org/markup-compatibility/2006" xmlns:p159="http://schemas.microsoft.com/office/powerpoint/2015/09/main">
+    <mc:Choice Requires="p159">
       <p:transition xmlns:p14="http://schemas.microsoft.com/office/powerpoint/2010/main" spd="slow" p14:dur="2000">
         <p159:morph option="byObject"/>
       </p:transition>
     </mc:Choice>
-    <mc:Fallback>
+    <mc:Fallback xmlns="">
       <p:transition spd="slow">
         <p:fade/>
       </p:transition>
@@ -6967,13 +6993,13 @@
   <p:clrMapOvr>
     <a:masterClrMapping/>
   </p:clrMapOvr>
-  <mc:AlternateContent xmlns:mc="http://schemas.openxmlformats.org/markup-compatibility/2006">
-    <mc:Choice xmlns:p159="http://schemas.microsoft.com/office/powerpoint/2015/09/main" Requires="p159">
+  <mc:AlternateContent xmlns:mc="http://schemas.openxmlformats.org/markup-compatibility/2006" xmlns:p159="http://schemas.microsoft.com/office/powerpoint/2015/09/main">
+    <mc:Choice Requires="p159">
       <p:transition xmlns:p14="http://schemas.microsoft.com/office/powerpoint/2010/main" spd="slow" p14:dur="2000">
         <p159:morph option="byObject"/>
       </p:transition>
     </mc:Choice>
-    <mc:Fallback>
+    <mc:Fallback xmlns="">
       <p:transition spd="slow">
         <p:fade/>
       </p:transition>
@@ -7440,13 +7466,13 @@
   <p:clrMapOvr>
     <a:masterClrMapping/>
   </p:clrMapOvr>
-  <mc:AlternateContent xmlns:mc="http://schemas.openxmlformats.org/markup-compatibility/2006">
-    <mc:Choice xmlns:p159="http://schemas.microsoft.com/office/powerpoint/2015/09/main" Requires="p159">
+  <mc:AlternateContent xmlns:mc="http://schemas.openxmlformats.org/markup-compatibility/2006" xmlns:p159="http://schemas.microsoft.com/office/powerpoint/2015/09/main">
+    <mc:Choice Requires="p159">
       <p:transition xmlns:p14="http://schemas.microsoft.com/office/powerpoint/2010/main" spd="slow" p14:dur="2000">
         <p159:morph option="byObject"/>
       </p:transition>
     </mc:Choice>
-    <mc:Fallback>
+    <mc:Fallback xmlns="">
       <p:transition spd="slow">
         <p:fade/>
       </p:transition>
@@ -7456,6 +7482,673 @@
 </file>
 
 <file path=ppt/slides/slide7.xml><?xml version="1.0" encoding="utf-8"?>
+<p:sld xmlns:a="http://schemas.openxmlformats.org/drawingml/2006/main" xmlns:r="http://schemas.openxmlformats.org/officeDocument/2006/relationships" xmlns:p="http://schemas.openxmlformats.org/presentationml/2006/main">
+  <p:cSld>
+    <p:spTree>
+      <p:nvGrpSpPr>
+        <p:cNvPr id="1" name="">
+          <a:extLst>
+            <a:ext uri="{FF2B5EF4-FFF2-40B4-BE49-F238E27FC236}">
+              <a16:creationId xmlns:a16="http://schemas.microsoft.com/office/drawing/2014/main" id="{A2114667-0AD7-B79F-8FC8-C7E83D1DEF41}"/>
+            </a:ext>
+          </a:extLst>
+        </p:cNvPr>
+        <p:cNvGrpSpPr/>
+        <p:nvPr/>
+      </p:nvGrpSpPr>
+      <p:grpSpPr>
+        <a:xfrm>
+          <a:off x="0" y="0"/>
+          <a:ext cx="0" cy="0"/>
+          <a:chOff x="0" y="0"/>
+          <a:chExt cx="0" cy="0"/>
+        </a:xfrm>
+      </p:grpSpPr>
+      <p:pic>
+        <p:nvPicPr>
+          <p:cNvPr id="4" name="Picture 3" descr="A blue and orange logo">
+            <a:extLst>
+              <a:ext uri="{FF2B5EF4-FFF2-40B4-BE49-F238E27FC236}">
+                <a16:creationId xmlns:a16="http://schemas.microsoft.com/office/drawing/2014/main" id="{EC55C639-182D-70F0-27F3-B93AE3D918B3}"/>
+              </a:ext>
+            </a:extLst>
+          </p:cNvPr>
+          <p:cNvPicPr>
+            <a:picLocks noChangeAspect="1"/>
+          </p:cNvPicPr>
+          <p:nvPr/>
+        </p:nvPicPr>
+        <p:blipFill>
+          <a:blip r:embed="rId2">
+            <a:extLst>
+              <a:ext uri="{28A0092B-C50C-407E-A947-70E740481C1C}">
+                <a14:useLocalDpi xmlns:a14="http://schemas.microsoft.com/office/drawing/2010/main" val="0"/>
+              </a:ext>
+            </a:extLst>
+          </a:blip>
+          <a:srcRect r="40990"/>
+          <a:stretch/>
+        </p:blipFill>
+        <p:spPr>
+          <a:xfrm>
+            <a:off x="10762034" y="0"/>
+            <a:ext cx="1429966" cy="986828"/>
+          </a:xfrm>
+          <a:prstGeom prst="rect">
+            <a:avLst/>
+          </a:prstGeom>
+        </p:spPr>
+      </p:pic>
+      <p:sp>
+        <p:nvSpPr>
+          <p:cNvPr id="5" name="Rectangle: Rounded Corners 4">
+            <a:extLst>
+              <a:ext uri="{FF2B5EF4-FFF2-40B4-BE49-F238E27FC236}">
+                <a16:creationId xmlns:a16="http://schemas.microsoft.com/office/drawing/2014/main" id="{9F382A36-EC46-2605-2721-0659D50B5877}"/>
+              </a:ext>
+            </a:extLst>
+          </p:cNvPr>
+          <p:cNvSpPr/>
+          <p:nvPr/>
+        </p:nvSpPr>
+        <p:spPr>
+          <a:xfrm>
+            <a:off x="470168" y="493414"/>
+            <a:ext cx="3936462" cy="924128"/>
+          </a:xfrm>
+          <a:prstGeom prst="roundRect">
+            <a:avLst/>
+          </a:prstGeom>
+          <a:solidFill>
+            <a:srgbClr val="02082C"/>
+          </a:solidFill>
+          <a:ln w="28575">
+            <a:solidFill>
+              <a:srgbClr val="FF9933"/>
+            </a:solidFill>
+          </a:ln>
+        </p:spPr>
+        <p:style>
+          <a:lnRef idx="2">
+            <a:schemeClr val="accent1">
+              <a:shade val="15000"/>
+            </a:schemeClr>
+          </a:lnRef>
+          <a:fillRef idx="1">
+            <a:schemeClr val="accent1"/>
+          </a:fillRef>
+          <a:effectRef idx="0">
+            <a:schemeClr val="accent1"/>
+          </a:effectRef>
+          <a:fontRef idx="minor">
+            <a:schemeClr val="lt1"/>
+          </a:fontRef>
+        </p:style>
+        <p:txBody>
+          <a:bodyPr rtlCol="0" anchor="ctr"/>
+          <a:lstStyle/>
+          <a:p>
+            <a:r>
+              <a:rPr lang="pt-BR" sz="4400" dirty="0">
+                <a:solidFill>
+                  <a:srgbClr val="FF9933"/>
+                </a:solidFill>
+              </a:rPr>
+              <a:t>Métodos http</a:t>
+            </a:r>
+          </a:p>
+        </p:txBody>
+      </p:sp>
+      <p:sp>
+        <p:nvSpPr>
+          <p:cNvPr id="2" name="Rectangle: Rounded Corners 1">
+            <a:extLst>
+              <a:ext uri="{FF2B5EF4-FFF2-40B4-BE49-F238E27FC236}">
+                <a16:creationId xmlns:a16="http://schemas.microsoft.com/office/drawing/2014/main" id="{5FFE16C7-B364-5612-CABC-07A5B9982FE3}"/>
+              </a:ext>
+            </a:extLst>
+          </p:cNvPr>
+          <p:cNvSpPr/>
+          <p:nvPr/>
+        </p:nvSpPr>
+        <p:spPr>
+          <a:xfrm>
+            <a:off x="2960454" y="2013627"/>
+            <a:ext cx="5453978" cy="768484"/>
+          </a:xfrm>
+          <a:prstGeom prst="roundRect">
+            <a:avLst/>
+          </a:prstGeom>
+          <a:solidFill>
+            <a:srgbClr val="02082C"/>
+          </a:solidFill>
+          <a:ln w="28575">
+            <a:solidFill>
+              <a:srgbClr val="FF9933"/>
+            </a:solidFill>
+          </a:ln>
+        </p:spPr>
+        <p:style>
+          <a:lnRef idx="2">
+            <a:schemeClr val="accent1">
+              <a:shade val="15000"/>
+            </a:schemeClr>
+          </a:lnRef>
+          <a:fillRef idx="1">
+            <a:schemeClr val="accent1"/>
+          </a:fillRef>
+          <a:effectRef idx="0">
+            <a:schemeClr val="accent1"/>
+          </a:effectRef>
+          <a:fontRef idx="minor">
+            <a:schemeClr val="lt1"/>
+          </a:fontRef>
+        </p:style>
+        <p:txBody>
+          <a:bodyPr rtlCol="0" anchor="ctr"/>
+          <a:lstStyle/>
+          <a:p>
+            <a:r>
+              <a:rPr lang="pt-BR" sz="1800" b="1" i="0" u="none" strike="noStrike" baseline="0" dirty="0">
+                <a:solidFill>
+                  <a:srgbClr val="FFFF00"/>
+                </a:solidFill>
+                <a:latin typeface="Poppins-Regular"/>
+              </a:rPr>
+              <a:t>GET:</a:t>
+            </a:r>
+          </a:p>
+          <a:p>
+            <a:r>
+              <a:rPr lang="pt-BR" b="1" dirty="0">
+                <a:solidFill>
+                  <a:srgbClr val="FF9933"/>
+                </a:solidFill>
+                <a:latin typeface="Poppins-Regular"/>
+              </a:rPr>
+              <a:t>	http://api.com/</a:t>
+            </a:r>
+            <a:r>
+              <a:rPr lang="pt-BR" b="1" dirty="0">
+                <a:solidFill>
+                  <a:srgbClr val="92D050"/>
+                </a:solidFill>
+                <a:latin typeface="Poppins-Regular"/>
+              </a:rPr>
+              <a:t>users</a:t>
+            </a:r>
+            <a:endParaRPr lang="pt-BR" sz="3600" dirty="0">
+              <a:solidFill>
+                <a:srgbClr val="92D050"/>
+              </a:solidFill>
+            </a:endParaRPr>
+          </a:p>
+        </p:txBody>
+      </p:sp>
+      <p:sp>
+        <p:nvSpPr>
+          <p:cNvPr id="3" name="Rectangle: Rounded Corners 2">
+            <a:extLst>
+              <a:ext uri="{FF2B5EF4-FFF2-40B4-BE49-F238E27FC236}">
+                <a16:creationId xmlns:a16="http://schemas.microsoft.com/office/drawing/2014/main" id="{DEA49BB2-8598-4B84-DF9F-70541C095D3F}"/>
+              </a:ext>
+            </a:extLst>
+          </p:cNvPr>
+          <p:cNvSpPr/>
+          <p:nvPr/>
+        </p:nvSpPr>
+        <p:spPr>
+          <a:xfrm>
+            <a:off x="2960453" y="3173916"/>
+            <a:ext cx="5453981" cy="768484"/>
+          </a:xfrm>
+          <a:prstGeom prst="roundRect">
+            <a:avLst/>
+          </a:prstGeom>
+          <a:solidFill>
+            <a:srgbClr val="02082C"/>
+          </a:solidFill>
+          <a:ln w="28575">
+            <a:solidFill>
+              <a:srgbClr val="FF9933"/>
+            </a:solidFill>
+          </a:ln>
+        </p:spPr>
+        <p:style>
+          <a:lnRef idx="2">
+            <a:schemeClr val="accent1">
+              <a:shade val="15000"/>
+            </a:schemeClr>
+          </a:lnRef>
+          <a:fillRef idx="1">
+            <a:schemeClr val="accent1"/>
+          </a:fillRef>
+          <a:effectRef idx="0">
+            <a:schemeClr val="accent1"/>
+          </a:effectRef>
+          <a:fontRef idx="minor">
+            <a:schemeClr val="lt1"/>
+          </a:fontRef>
+        </p:style>
+        <p:txBody>
+          <a:bodyPr rtlCol="0" anchor="ctr"/>
+          <a:lstStyle/>
+          <a:p>
+            <a:r>
+              <a:rPr lang="pt-BR" sz="1800" b="1" i="0" u="none" strike="noStrike" baseline="0" dirty="0">
+                <a:solidFill>
+                  <a:srgbClr val="FFFF00"/>
+                </a:solidFill>
+                <a:latin typeface="Poppins-Regular"/>
+              </a:rPr>
+              <a:t>POST:</a:t>
+            </a:r>
+          </a:p>
+          <a:p>
+            <a:r>
+              <a:rPr lang="pt-BR" sz="1800" b="1" i="0" u="none" strike="noStrike" baseline="0" dirty="0">
+                <a:solidFill>
+                  <a:srgbClr val="FF9933"/>
+                </a:solidFill>
+                <a:latin typeface="Poppins-Regular"/>
+              </a:rPr>
+              <a:t>	http://api.com/</a:t>
+            </a:r>
+            <a:r>
+              <a:rPr lang="pt-BR" sz="1800" b="1" i="0" u="none" strike="noStrike" baseline="0" dirty="0">
+                <a:solidFill>
+                  <a:srgbClr val="92D050"/>
+                </a:solidFill>
+                <a:latin typeface="Poppins-Regular"/>
+              </a:rPr>
+              <a:t>users</a:t>
+            </a:r>
+          </a:p>
+        </p:txBody>
+      </p:sp>
+      <p:sp>
+        <p:nvSpPr>
+          <p:cNvPr id="7" name="Rectangle: Rounded Corners 6">
+            <a:extLst>
+              <a:ext uri="{FF2B5EF4-FFF2-40B4-BE49-F238E27FC236}">
+                <a16:creationId xmlns:a16="http://schemas.microsoft.com/office/drawing/2014/main" id="{EE938E58-3B4C-4243-74A3-F6E7DE562314}"/>
+              </a:ext>
+            </a:extLst>
+          </p:cNvPr>
+          <p:cNvSpPr/>
+          <p:nvPr/>
+        </p:nvSpPr>
+        <p:spPr>
+          <a:xfrm>
+            <a:off x="2960453" y="4334206"/>
+            <a:ext cx="5453980" cy="583200"/>
+          </a:xfrm>
+          <a:prstGeom prst="roundRect">
+            <a:avLst/>
+          </a:prstGeom>
+          <a:solidFill>
+            <a:srgbClr val="02082C"/>
+          </a:solidFill>
+          <a:ln w="28575">
+            <a:solidFill>
+              <a:srgbClr val="FF9933"/>
+            </a:solidFill>
+          </a:ln>
+        </p:spPr>
+        <p:style>
+          <a:lnRef idx="2">
+            <a:schemeClr val="accent1">
+              <a:shade val="15000"/>
+            </a:schemeClr>
+          </a:lnRef>
+          <a:fillRef idx="1">
+            <a:schemeClr val="accent1"/>
+          </a:fillRef>
+          <a:effectRef idx="0">
+            <a:schemeClr val="accent1"/>
+          </a:effectRef>
+          <a:fontRef idx="minor">
+            <a:schemeClr val="lt1"/>
+          </a:fontRef>
+        </p:style>
+        <p:txBody>
+          <a:bodyPr rtlCol="0" anchor="ctr"/>
+          <a:lstStyle/>
+          <a:p>
+            <a:r>
+              <a:rPr lang="pt-BR" sz="1800" b="1" i="0" u="none" strike="noStrike" baseline="0" dirty="0">
+                <a:solidFill>
+                  <a:srgbClr val="FFFF00"/>
+                </a:solidFill>
+                <a:latin typeface="Poppins-Regular"/>
+              </a:rPr>
+              <a:t>PUT:</a:t>
+            </a:r>
+          </a:p>
+          <a:p>
+            <a:r>
+              <a:rPr lang="pt-BR" sz="1800" b="1" i="0" u="none" strike="noStrike" baseline="0" dirty="0">
+                <a:solidFill>
+                  <a:srgbClr val="FF9933"/>
+                </a:solidFill>
+                <a:latin typeface="Poppins-Regular"/>
+              </a:rPr>
+              <a:t>	http://api.com/</a:t>
+            </a:r>
+            <a:r>
+              <a:rPr lang="pt-BR" sz="1800" b="1" i="0" u="none" strike="noStrike" baseline="0" dirty="0">
+                <a:solidFill>
+                  <a:srgbClr val="92D050"/>
+                </a:solidFill>
+                <a:latin typeface="Poppins-Regular"/>
+              </a:rPr>
+              <a:t>users</a:t>
+            </a:r>
+            <a:r>
+              <a:rPr lang="pt-BR" sz="1800" b="1" i="0" u="none" strike="noStrike" baseline="0" dirty="0">
+                <a:solidFill>
+                  <a:srgbClr val="FF0000"/>
+                </a:solidFill>
+                <a:latin typeface="Poppins-Regular"/>
+              </a:rPr>
+              <a:t>/1</a:t>
+            </a:r>
+          </a:p>
+        </p:txBody>
+      </p:sp>
+      <p:sp>
+        <p:nvSpPr>
+          <p:cNvPr id="8" name="Rectangle: Rounded Corners 7">
+            <a:extLst>
+              <a:ext uri="{FF2B5EF4-FFF2-40B4-BE49-F238E27FC236}">
+                <a16:creationId xmlns:a16="http://schemas.microsoft.com/office/drawing/2014/main" id="{FCB3525A-C586-515F-6F1B-68AFD5E6293D}"/>
+              </a:ext>
+            </a:extLst>
+          </p:cNvPr>
+          <p:cNvSpPr/>
+          <p:nvPr/>
+        </p:nvSpPr>
+        <p:spPr>
+          <a:xfrm>
+            <a:off x="2960452" y="5384793"/>
+            <a:ext cx="5453980" cy="583200"/>
+          </a:xfrm>
+          <a:prstGeom prst="roundRect">
+            <a:avLst/>
+          </a:prstGeom>
+          <a:solidFill>
+            <a:srgbClr val="02082C"/>
+          </a:solidFill>
+          <a:ln w="28575">
+            <a:solidFill>
+              <a:srgbClr val="FF9933"/>
+            </a:solidFill>
+          </a:ln>
+        </p:spPr>
+        <p:style>
+          <a:lnRef idx="2">
+            <a:schemeClr val="accent1">
+              <a:shade val="15000"/>
+            </a:schemeClr>
+          </a:lnRef>
+          <a:fillRef idx="1">
+            <a:schemeClr val="accent1"/>
+          </a:fillRef>
+          <a:effectRef idx="0">
+            <a:schemeClr val="accent1"/>
+          </a:effectRef>
+          <a:fontRef idx="minor">
+            <a:schemeClr val="lt1"/>
+          </a:fontRef>
+        </p:style>
+        <p:txBody>
+          <a:bodyPr rtlCol="0" anchor="ctr"/>
+          <a:lstStyle/>
+          <a:p>
+            <a:r>
+              <a:rPr lang="pt-BR" sz="1800" b="1" i="0" u="none" strike="noStrike" baseline="0" dirty="0">
+                <a:solidFill>
+                  <a:srgbClr val="FFFF00"/>
+                </a:solidFill>
+                <a:latin typeface="Poppins-Regular"/>
+              </a:rPr>
+              <a:t>DELETE:</a:t>
+            </a:r>
+          </a:p>
+          <a:p>
+            <a:r>
+              <a:rPr lang="pt-BR" sz="1800" b="1" i="0" u="none" strike="noStrike" baseline="0" dirty="0">
+                <a:solidFill>
+                  <a:srgbClr val="FF9933"/>
+                </a:solidFill>
+                <a:latin typeface="Poppins-Regular"/>
+              </a:rPr>
+              <a:t>	http://api.com/</a:t>
+            </a:r>
+            <a:r>
+              <a:rPr lang="pt-BR" sz="1800" b="1" i="0" u="none" strike="noStrike" baseline="0" dirty="0">
+                <a:solidFill>
+                  <a:srgbClr val="92D050"/>
+                </a:solidFill>
+                <a:latin typeface="Poppins-Regular"/>
+              </a:rPr>
+              <a:t>users</a:t>
+            </a:r>
+            <a:r>
+              <a:rPr lang="pt-BR" sz="1800" b="1" i="0" u="none" strike="noStrike" baseline="0" dirty="0">
+                <a:solidFill>
+                  <a:srgbClr val="FF0000"/>
+                </a:solidFill>
+                <a:latin typeface="Poppins-Regular"/>
+              </a:rPr>
+              <a:t>/1</a:t>
+            </a:r>
+          </a:p>
+        </p:txBody>
+      </p:sp>
+      <p:sp>
+        <p:nvSpPr>
+          <p:cNvPr id="10" name="Rectangle: Rounded Corners 9">
+            <a:extLst>
+              <a:ext uri="{FF2B5EF4-FFF2-40B4-BE49-F238E27FC236}">
+                <a16:creationId xmlns:a16="http://schemas.microsoft.com/office/drawing/2014/main" id="{C259888F-61B1-5C65-AB77-2C24999D0100}"/>
+              </a:ext>
+            </a:extLst>
+          </p:cNvPr>
+          <p:cNvSpPr/>
+          <p:nvPr/>
+        </p:nvSpPr>
+        <p:spPr>
+          <a:xfrm>
+            <a:off x="1292167" y="3716573"/>
+            <a:ext cx="1498059" cy="583660"/>
+          </a:xfrm>
+          <a:prstGeom prst="roundRect">
+            <a:avLst/>
+          </a:prstGeom>
+          <a:solidFill>
+            <a:srgbClr val="FFFF00"/>
+          </a:solidFill>
+          <a:ln>
+            <a:noFill/>
+          </a:ln>
+        </p:spPr>
+        <p:style>
+          <a:lnRef idx="2">
+            <a:schemeClr val="accent2">
+              <a:shade val="15000"/>
+            </a:schemeClr>
+          </a:lnRef>
+          <a:fillRef idx="1">
+            <a:schemeClr val="accent2"/>
+          </a:fillRef>
+          <a:effectRef idx="0">
+            <a:schemeClr val="accent2"/>
+          </a:effectRef>
+          <a:fontRef idx="minor">
+            <a:schemeClr val="lt1"/>
+          </a:fontRef>
+        </p:style>
+        <p:txBody>
+          <a:bodyPr rtlCol="0" anchor="ctr"/>
+          <a:lstStyle/>
+          <a:p>
+            <a:pPr algn="ctr"/>
+            <a:r>
+              <a:rPr lang="pt-BR" b="1" dirty="0">
+                <a:solidFill>
+                  <a:srgbClr val="02082C"/>
+                </a:solidFill>
+              </a:rPr>
+              <a:t>Método</a:t>
+            </a:r>
+          </a:p>
+        </p:txBody>
+      </p:sp>
+      <p:sp>
+        <p:nvSpPr>
+          <p:cNvPr id="11" name="Rectangle: Rounded Corners 10">
+            <a:extLst>
+              <a:ext uri="{FF2B5EF4-FFF2-40B4-BE49-F238E27FC236}">
+                <a16:creationId xmlns:a16="http://schemas.microsoft.com/office/drawing/2014/main" id="{A2498384-ABAA-3D7C-D3AC-4FC171975C6E}"/>
+              </a:ext>
+            </a:extLst>
+          </p:cNvPr>
+          <p:cNvSpPr/>
+          <p:nvPr/>
+        </p:nvSpPr>
+        <p:spPr>
+          <a:xfrm>
+            <a:off x="5162144" y="1222991"/>
+            <a:ext cx="1867712" cy="583660"/>
+          </a:xfrm>
+          <a:prstGeom prst="roundRect">
+            <a:avLst/>
+          </a:prstGeom>
+          <a:solidFill>
+            <a:srgbClr val="92D050"/>
+          </a:solidFill>
+          <a:ln>
+            <a:noFill/>
+          </a:ln>
+        </p:spPr>
+        <p:style>
+          <a:lnRef idx="2">
+            <a:schemeClr val="accent2">
+              <a:shade val="15000"/>
+            </a:schemeClr>
+          </a:lnRef>
+          <a:fillRef idx="1">
+            <a:schemeClr val="accent2"/>
+          </a:fillRef>
+          <a:effectRef idx="0">
+            <a:schemeClr val="accent2"/>
+          </a:effectRef>
+          <a:fontRef idx="minor">
+            <a:schemeClr val="lt1"/>
+          </a:fontRef>
+        </p:style>
+        <p:txBody>
+          <a:bodyPr rtlCol="0" anchor="ctr"/>
+          <a:lstStyle/>
+          <a:p>
+            <a:pPr algn="ctr"/>
+            <a:r>
+              <a:rPr lang="pt-BR" b="1" dirty="0">
+                <a:solidFill>
+                  <a:srgbClr val="02082C"/>
+                </a:solidFill>
+              </a:rPr>
+              <a:t>Recurso/Rota</a:t>
+            </a:r>
+          </a:p>
+        </p:txBody>
+      </p:sp>
+      <p:sp>
+        <p:nvSpPr>
+          <p:cNvPr id="12" name="Rectangle: Rounded Corners 11">
+            <a:extLst>
+              <a:ext uri="{FF2B5EF4-FFF2-40B4-BE49-F238E27FC236}">
+                <a16:creationId xmlns:a16="http://schemas.microsoft.com/office/drawing/2014/main" id="{4F4FE752-3B18-D59B-070F-8C4940D60999}"/>
+              </a:ext>
+            </a:extLst>
+          </p:cNvPr>
+          <p:cNvSpPr/>
+          <p:nvPr/>
+        </p:nvSpPr>
+        <p:spPr>
+          <a:xfrm>
+            <a:off x="8745172" y="4864208"/>
+            <a:ext cx="1867712" cy="583660"/>
+          </a:xfrm>
+          <a:prstGeom prst="roundRect">
+            <a:avLst/>
+          </a:prstGeom>
+          <a:solidFill>
+            <a:srgbClr val="FF0000"/>
+          </a:solidFill>
+          <a:ln>
+            <a:noFill/>
+          </a:ln>
+        </p:spPr>
+        <p:style>
+          <a:lnRef idx="2">
+            <a:schemeClr val="accent2">
+              <a:shade val="15000"/>
+            </a:schemeClr>
+          </a:lnRef>
+          <a:fillRef idx="1">
+            <a:schemeClr val="accent2"/>
+          </a:fillRef>
+          <a:effectRef idx="0">
+            <a:schemeClr val="accent2"/>
+          </a:effectRef>
+          <a:fontRef idx="minor">
+            <a:schemeClr val="lt1"/>
+          </a:fontRef>
+        </p:style>
+        <p:txBody>
+          <a:bodyPr rtlCol="0" anchor="ctr"/>
+          <a:lstStyle/>
+          <a:p>
+            <a:pPr algn="ctr"/>
+            <a:r>
+              <a:rPr lang="pt-BR" b="1" dirty="0">
+                <a:solidFill>
+                  <a:srgbClr val="02082C"/>
+                </a:solidFill>
+              </a:rPr>
+              <a:t>Parâmetro</a:t>
+            </a:r>
+          </a:p>
+        </p:txBody>
+      </p:sp>
+    </p:spTree>
+    <p:extLst>
+      <p:ext uri="{BB962C8B-B14F-4D97-AF65-F5344CB8AC3E}">
+        <p14:creationId xmlns:p14="http://schemas.microsoft.com/office/powerpoint/2010/main" val="3068809172"/>
+      </p:ext>
+    </p:extLst>
+  </p:cSld>
+  <p:clrMapOvr>
+    <a:masterClrMapping/>
+  </p:clrMapOvr>
+  <mc:AlternateContent xmlns:mc="http://schemas.openxmlformats.org/markup-compatibility/2006" xmlns:p159="http://schemas.microsoft.com/office/powerpoint/2015/09/main">
+    <mc:Choice Requires="p159">
+      <p:transition xmlns:p14="http://schemas.microsoft.com/office/powerpoint/2010/main" spd="slow" p14:dur="2000">
+        <p159:morph option="byObject"/>
+      </p:transition>
+    </mc:Choice>
+    <mc:Fallback xmlns="">
+      <p:transition spd="slow">
+        <p:fade/>
+      </p:transition>
+    </mc:Fallback>
+  </mc:AlternateContent>
+</p:sld>
+</file>
+
+<file path=ppt/slides/slide8.xml><?xml version="1.0" encoding="utf-8"?>
 <p:sld xmlns:a="http://schemas.openxmlformats.org/drawingml/2006/main" xmlns:r="http://schemas.openxmlformats.org/officeDocument/2006/relationships" xmlns:p="http://schemas.openxmlformats.org/presentationml/2006/main">
   <p:cSld>
     <p:spTree>
@@ -8161,680 +8854,13 @@
   <p:clrMapOvr>
     <a:masterClrMapping/>
   </p:clrMapOvr>
-  <mc:AlternateContent xmlns:mc="http://schemas.openxmlformats.org/markup-compatibility/2006">
-    <mc:Choice xmlns:p159="http://schemas.microsoft.com/office/powerpoint/2015/09/main" Requires="p159">
+  <mc:AlternateContent xmlns:mc="http://schemas.openxmlformats.org/markup-compatibility/2006" xmlns:p159="http://schemas.microsoft.com/office/powerpoint/2015/09/main">
+    <mc:Choice Requires="p159">
       <p:transition xmlns:p14="http://schemas.microsoft.com/office/powerpoint/2010/main" spd="slow" p14:dur="2000">
         <p159:morph option="byObject"/>
       </p:transition>
     </mc:Choice>
-    <mc:Fallback>
-      <p:transition spd="slow">
-        <p:fade/>
-      </p:transition>
-    </mc:Fallback>
-  </mc:AlternateContent>
-</p:sld>
-</file>
-
-<file path=ppt/slides/slide8.xml><?xml version="1.0" encoding="utf-8"?>
-<p:sld xmlns:a="http://schemas.openxmlformats.org/drawingml/2006/main" xmlns:r="http://schemas.openxmlformats.org/officeDocument/2006/relationships" xmlns:p="http://schemas.openxmlformats.org/presentationml/2006/main">
-  <p:cSld>
-    <p:spTree>
-      <p:nvGrpSpPr>
-        <p:cNvPr id="1" name="">
-          <a:extLst>
-            <a:ext uri="{FF2B5EF4-FFF2-40B4-BE49-F238E27FC236}">
-              <a16:creationId xmlns:a16="http://schemas.microsoft.com/office/drawing/2014/main" id="{A2114667-0AD7-B79F-8FC8-C7E83D1DEF41}"/>
-            </a:ext>
-          </a:extLst>
-        </p:cNvPr>
-        <p:cNvGrpSpPr/>
-        <p:nvPr/>
-      </p:nvGrpSpPr>
-      <p:grpSpPr>
-        <a:xfrm>
-          <a:off x="0" y="0"/>
-          <a:ext cx="0" cy="0"/>
-          <a:chOff x="0" y="0"/>
-          <a:chExt cx="0" cy="0"/>
-        </a:xfrm>
-      </p:grpSpPr>
-      <p:pic>
-        <p:nvPicPr>
-          <p:cNvPr id="4" name="Picture 3" descr="A blue and orange logo">
-            <a:extLst>
-              <a:ext uri="{FF2B5EF4-FFF2-40B4-BE49-F238E27FC236}">
-                <a16:creationId xmlns:a16="http://schemas.microsoft.com/office/drawing/2014/main" id="{EC55C639-182D-70F0-27F3-B93AE3D918B3}"/>
-              </a:ext>
-            </a:extLst>
-          </p:cNvPr>
-          <p:cNvPicPr>
-            <a:picLocks noChangeAspect="1"/>
-          </p:cNvPicPr>
-          <p:nvPr/>
-        </p:nvPicPr>
-        <p:blipFill>
-          <a:blip r:embed="rId2">
-            <a:extLst>
-              <a:ext uri="{28A0092B-C50C-407E-A947-70E740481C1C}">
-                <a14:useLocalDpi xmlns:a14="http://schemas.microsoft.com/office/drawing/2010/main" val="0"/>
-              </a:ext>
-            </a:extLst>
-          </a:blip>
-          <a:srcRect r="40990"/>
-          <a:stretch/>
-        </p:blipFill>
-        <p:spPr>
-          <a:xfrm>
-            <a:off x="10762034" y="0"/>
-            <a:ext cx="1429966" cy="986828"/>
-          </a:xfrm>
-          <a:prstGeom prst="rect">
-            <a:avLst/>
-          </a:prstGeom>
-        </p:spPr>
-      </p:pic>
-      <p:sp>
-        <p:nvSpPr>
-          <p:cNvPr id="5" name="Rectangle: Rounded Corners 4">
-            <a:extLst>
-              <a:ext uri="{FF2B5EF4-FFF2-40B4-BE49-F238E27FC236}">
-                <a16:creationId xmlns:a16="http://schemas.microsoft.com/office/drawing/2014/main" id="{9F382A36-EC46-2605-2721-0659D50B5877}"/>
-              </a:ext>
-            </a:extLst>
-          </p:cNvPr>
-          <p:cNvSpPr/>
-          <p:nvPr/>
-        </p:nvSpPr>
-        <p:spPr>
-          <a:xfrm>
-            <a:off x="470168" y="493414"/>
-            <a:ext cx="3936462" cy="924128"/>
-          </a:xfrm>
-          <a:prstGeom prst="roundRect">
-            <a:avLst/>
-          </a:prstGeom>
-          <a:solidFill>
-            <a:srgbClr val="02082C"/>
-          </a:solidFill>
-          <a:ln w="28575">
-            <a:solidFill>
-              <a:srgbClr val="FF9933"/>
-            </a:solidFill>
-          </a:ln>
-        </p:spPr>
-        <p:style>
-          <a:lnRef idx="2">
-            <a:schemeClr val="accent1">
-              <a:shade val="15000"/>
-            </a:schemeClr>
-          </a:lnRef>
-          <a:fillRef idx="1">
-            <a:schemeClr val="accent1"/>
-          </a:fillRef>
-          <a:effectRef idx="0">
-            <a:schemeClr val="accent1"/>
-          </a:effectRef>
-          <a:fontRef idx="minor">
-            <a:schemeClr val="lt1"/>
-          </a:fontRef>
-        </p:style>
-        <p:txBody>
-          <a:bodyPr rtlCol="0" anchor="ctr"/>
-          <a:lstStyle/>
-          <a:p>
-            <a:r>
-              <a:rPr lang="pt-BR" sz="4400" dirty="0">
-                <a:solidFill>
-                  <a:srgbClr val="FF9933"/>
-                </a:solidFill>
-              </a:rPr>
-              <a:t>Métodos http</a:t>
-            </a:r>
-          </a:p>
-        </p:txBody>
-      </p:sp>
-      <p:sp>
-        <p:nvSpPr>
-          <p:cNvPr id="2" name="Rectangle: Rounded Corners 1">
-            <a:extLst>
-              <a:ext uri="{FF2B5EF4-FFF2-40B4-BE49-F238E27FC236}">
-                <a16:creationId xmlns:a16="http://schemas.microsoft.com/office/drawing/2014/main" id="{5FFE16C7-B364-5612-CABC-07A5B9982FE3}"/>
-              </a:ext>
-            </a:extLst>
-          </p:cNvPr>
-          <p:cNvSpPr/>
-          <p:nvPr/>
-        </p:nvSpPr>
-        <p:spPr>
-          <a:xfrm>
-            <a:off x="2960454" y="2013627"/>
-            <a:ext cx="5453978" cy="768484"/>
-          </a:xfrm>
-          <a:prstGeom prst="roundRect">
-            <a:avLst/>
-          </a:prstGeom>
-          <a:solidFill>
-            <a:srgbClr val="02082C"/>
-          </a:solidFill>
-          <a:ln w="28575">
-            <a:solidFill>
-              <a:srgbClr val="FF9933"/>
-            </a:solidFill>
-          </a:ln>
-        </p:spPr>
-        <p:style>
-          <a:lnRef idx="2">
-            <a:schemeClr val="accent1">
-              <a:shade val="15000"/>
-            </a:schemeClr>
-          </a:lnRef>
-          <a:fillRef idx="1">
-            <a:schemeClr val="accent1"/>
-          </a:fillRef>
-          <a:effectRef idx="0">
-            <a:schemeClr val="accent1"/>
-          </a:effectRef>
-          <a:fontRef idx="minor">
-            <a:schemeClr val="lt1"/>
-          </a:fontRef>
-        </p:style>
-        <p:txBody>
-          <a:bodyPr rtlCol="0" anchor="ctr"/>
-          <a:lstStyle/>
-          <a:p>
-            <a:r>
-              <a:rPr lang="pt-BR" sz="1800" b="1" i="0" u="none" strike="noStrike" baseline="0" dirty="0">
-                <a:solidFill>
-                  <a:srgbClr val="FFFF00"/>
-                </a:solidFill>
-                <a:latin typeface="Poppins-Regular"/>
-              </a:rPr>
-              <a:t>GET:</a:t>
-            </a:r>
-          </a:p>
-          <a:p>
-            <a:r>
-              <a:rPr lang="pt-BR" b="1" dirty="0">
-                <a:solidFill>
-                  <a:srgbClr val="FF9933"/>
-                </a:solidFill>
-                <a:latin typeface="Poppins-Regular"/>
-              </a:rPr>
-              <a:t>	http://api.com/</a:t>
-            </a:r>
-            <a:r>
-              <a:rPr lang="pt-BR" b="1" dirty="0">
-                <a:solidFill>
-                  <a:srgbClr val="92D050"/>
-                </a:solidFill>
-                <a:latin typeface="Poppins-Regular"/>
-              </a:rPr>
-              <a:t>users</a:t>
-            </a:r>
-            <a:endParaRPr lang="pt-BR" sz="3600" dirty="0">
-              <a:solidFill>
-                <a:srgbClr val="92D050"/>
-              </a:solidFill>
-            </a:endParaRPr>
-          </a:p>
-        </p:txBody>
-      </p:sp>
-      <p:sp>
-        <p:nvSpPr>
-          <p:cNvPr id="3" name="Rectangle: Rounded Corners 2">
-            <a:extLst>
-              <a:ext uri="{FF2B5EF4-FFF2-40B4-BE49-F238E27FC236}">
-                <a16:creationId xmlns:a16="http://schemas.microsoft.com/office/drawing/2014/main" id="{DEA49BB2-8598-4B84-DF9F-70541C095D3F}"/>
-              </a:ext>
-            </a:extLst>
-          </p:cNvPr>
-          <p:cNvSpPr/>
-          <p:nvPr/>
-        </p:nvSpPr>
-        <p:spPr>
-          <a:xfrm>
-            <a:off x="2960453" y="3173916"/>
-            <a:ext cx="5453981" cy="768484"/>
-          </a:xfrm>
-          <a:prstGeom prst="roundRect">
-            <a:avLst/>
-          </a:prstGeom>
-          <a:solidFill>
-            <a:srgbClr val="02082C"/>
-          </a:solidFill>
-          <a:ln w="28575">
-            <a:solidFill>
-              <a:srgbClr val="FF9933"/>
-            </a:solidFill>
-          </a:ln>
-        </p:spPr>
-        <p:style>
-          <a:lnRef idx="2">
-            <a:schemeClr val="accent1">
-              <a:shade val="15000"/>
-            </a:schemeClr>
-          </a:lnRef>
-          <a:fillRef idx="1">
-            <a:schemeClr val="accent1"/>
-          </a:fillRef>
-          <a:effectRef idx="0">
-            <a:schemeClr val="accent1"/>
-          </a:effectRef>
-          <a:fontRef idx="minor">
-            <a:schemeClr val="lt1"/>
-          </a:fontRef>
-        </p:style>
-        <p:txBody>
-          <a:bodyPr rtlCol="0" anchor="ctr"/>
-          <a:lstStyle/>
-          <a:p>
-            <a:r>
-              <a:rPr lang="pt-BR" sz="1800" b="1" i="0" u="none" strike="noStrike" baseline="0" dirty="0">
-                <a:solidFill>
-                  <a:srgbClr val="FFFF00"/>
-                </a:solidFill>
-                <a:latin typeface="Poppins-Regular"/>
-              </a:rPr>
-              <a:t>POST:</a:t>
-            </a:r>
-          </a:p>
-          <a:p>
-            <a:r>
-              <a:rPr lang="pt-BR" sz="1800" b="1" i="0" u="none" strike="noStrike" baseline="0" dirty="0">
-                <a:solidFill>
-                  <a:srgbClr val="FF9933"/>
-                </a:solidFill>
-                <a:latin typeface="Poppins-Regular"/>
-              </a:rPr>
-              <a:t>	http://api.com/</a:t>
-            </a:r>
-            <a:r>
-              <a:rPr lang="pt-BR" sz="1800" b="1" i="0" u="none" strike="noStrike" baseline="0" dirty="0">
-                <a:solidFill>
-                  <a:srgbClr val="92D050"/>
-                </a:solidFill>
-                <a:latin typeface="Poppins-Regular"/>
-              </a:rPr>
-              <a:t>users</a:t>
-            </a:r>
-          </a:p>
-        </p:txBody>
-      </p:sp>
-      <p:sp>
-        <p:nvSpPr>
-          <p:cNvPr id="7" name="Rectangle: Rounded Corners 6">
-            <a:extLst>
-              <a:ext uri="{FF2B5EF4-FFF2-40B4-BE49-F238E27FC236}">
-                <a16:creationId xmlns:a16="http://schemas.microsoft.com/office/drawing/2014/main" id="{EE938E58-3B4C-4243-74A3-F6E7DE562314}"/>
-              </a:ext>
-            </a:extLst>
-          </p:cNvPr>
-          <p:cNvSpPr/>
-          <p:nvPr/>
-        </p:nvSpPr>
-        <p:spPr>
-          <a:xfrm>
-            <a:off x="2960453" y="4334206"/>
-            <a:ext cx="5453980" cy="583200"/>
-          </a:xfrm>
-          <a:prstGeom prst="roundRect">
-            <a:avLst/>
-          </a:prstGeom>
-          <a:solidFill>
-            <a:srgbClr val="02082C"/>
-          </a:solidFill>
-          <a:ln w="28575">
-            <a:solidFill>
-              <a:srgbClr val="FF9933"/>
-            </a:solidFill>
-          </a:ln>
-        </p:spPr>
-        <p:style>
-          <a:lnRef idx="2">
-            <a:schemeClr val="accent1">
-              <a:shade val="15000"/>
-            </a:schemeClr>
-          </a:lnRef>
-          <a:fillRef idx="1">
-            <a:schemeClr val="accent1"/>
-          </a:fillRef>
-          <a:effectRef idx="0">
-            <a:schemeClr val="accent1"/>
-          </a:effectRef>
-          <a:fontRef idx="minor">
-            <a:schemeClr val="lt1"/>
-          </a:fontRef>
-        </p:style>
-        <p:txBody>
-          <a:bodyPr rtlCol="0" anchor="ctr"/>
-          <a:lstStyle/>
-          <a:p>
-            <a:r>
-              <a:rPr lang="pt-BR" sz="1800" b="1" i="0" u="none" strike="noStrike" baseline="0" dirty="0">
-                <a:solidFill>
-                  <a:srgbClr val="FFFF00"/>
-                </a:solidFill>
-                <a:latin typeface="Poppins-Regular"/>
-              </a:rPr>
-              <a:t>PUT:</a:t>
-            </a:r>
-          </a:p>
-          <a:p>
-            <a:r>
-              <a:rPr lang="pt-BR" sz="1800" b="1" i="0" u="none" strike="noStrike" baseline="0" dirty="0">
-                <a:solidFill>
-                  <a:srgbClr val="FF9933"/>
-                </a:solidFill>
-                <a:latin typeface="Poppins-Regular"/>
-              </a:rPr>
-              <a:t>	http://api.com/</a:t>
-            </a:r>
-            <a:r>
-              <a:rPr lang="pt-BR" sz="1800" b="1" i="0" u="none" strike="noStrike" baseline="0" dirty="0">
-                <a:solidFill>
-                  <a:srgbClr val="92D050"/>
-                </a:solidFill>
-                <a:latin typeface="Poppins-Regular"/>
-              </a:rPr>
-              <a:t>users</a:t>
-            </a:r>
-            <a:r>
-              <a:rPr lang="pt-BR" sz="1800" b="1" i="0" u="none" strike="noStrike" baseline="0" dirty="0">
-                <a:solidFill>
-                  <a:srgbClr val="FF0000"/>
-                </a:solidFill>
-                <a:latin typeface="Poppins-Regular"/>
-              </a:rPr>
-              <a:t>/1</a:t>
-            </a:r>
-          </a:p>
-        </p:txBody>
-      </p:sp>
-      <p:sp>
-        <p:nvSpPr>
-          <p:cNvPr id="8" name="Rectangle: Rounded Corners 7">
-            <a:extLst>
-              <a:ext uri="{FF2B5EF4-FFF2-40B4-BE49-F238E27FC236}">
-                <a16:creationId xmlns:a16="http://schemas.microsoft.com/office/drawing/2014/main" id="{FCB3525A-C586-515F-6F1B-68AFD5E6293D}"/>
-              </a:ext>
-            </a:extLst>
-          </p:cNvPr>
-          <p:cNvSpPr/>
-          <p:nvPr/>
-        </p:nvSpPr>
-        <p:spPr>
-          <a:xfrm>
-            <a:off x="2960452" y="5384793"/>
-            <a:ext cx="5453980" cy="583200"/>
-          </a:xfrm>
-          <a:prstGeom prst="roundRect">
-            <a:avLst/>
-          </a:prstGeom>
-          <a:solidFill>
-            <a:srgbClr val="02082C"/>
-          </a:solidFill>
-          <a:ln w="28575">
-            <a:solidFill>
-              <a:srgbClr val="FF9933"/>
-            </a:solidFill>
-          </a:ln>
-        </p:spPr>
-        <p:style>
-          <a:lnRef idx="2">
-            <a:schemeClr val="accent1">
-              <a:shade val="15000"/>
-            </a:schemeClr>
-          </a:lnRef>
-          <a:fillRef idx="1">
-            <a:schemeClr val="accent1"/>
-          </a:fillRef>
-          <a:effectRef idx="0">
-            <a:schemeClr val="accent1"/>
-          </a:effectRef>
-          <a:fontRef idx="minor">
-            <a:schemeClr val="lt1"/>
-          </a:fontRef>
-        </p:style>
-        <p:txBody>
-          <a:bodyPr rtlCol="0" anchor="ctr"/>
-          <a:lstStyle/>
-          <a:p>
-            <a:r>
-              <a:rPr lang="pt-BR" sz="1800" b="1" i="0" u="none" strike="noStrike" baseline="0" dirty="0">
-                <a:solidFill>
-                  <a:srgbClr val="FFFF00"/>
-                </a:solidFill>
-                <a:latin typeface="Poppins-Regular"/>
-              </a:rPr>
-              <a:t>DELETE:</a:t>
-            </a:r>
-          </a:p>
-          <a:p>
-            <a:r>
-              <a:rPr lang="pt-BR" sz="1800" b="1" i="0" u="none" strike="noStrike" baseline="0" dirty="0">
-                <a:solidFill>
-                  <a:srgbClr val="FF9933"/>
-                </a:solidFill>
-                <a:latin typeface="Poppins-Regular"/>
-              </a:rPr>
-              <a:t>	http://api.com/</a:t>
-            </a:r>
-            <a:r>
-              <a:rPr lang="pt-BR" sz="1800" b="1" i="0" u="none" strike="noStrike" baseline="0" dirty="0">
-                <a:solidFill>
-                  <a:srgbClr val="92D050"/>
-                </a:solidFill>
-                <a:latin typeface="Poppins-Regular"/>
-              </a:rPr>
-              <a:t>users</a:t>
-            </a:r>
-            <a:r>
-              <a:rPr lang="pt-BR" sz="1800" b="1" i="0" u="none" strike="noStrike" baseline="0" dirty="0">
-                <a:solidFill>
-                  <a:srgbClr val="FF0000"/>
-                </a:solidFill>
-                <a:latin typeface="Poppins-Regular"/>
-              </a:rPr>
-              <a:t>/1</a:t>
-            </a:r>
-          </a:p>
-        </p:txBody>
-      </p:sp>
-      <p:sp>
-        <p:nvSpPr>
-          <p:cNvPr id="10" name="Rectangle: Rounded Corners 9">
-            <a:extLst>
-              <a:ext uri="{FF2B5EF4-FFF2-40B4-BE49-F238E27FC236}">
-                <a16:creationId xmlns:a16="http://schemas.microsoft.com/office/drawing/2014/main" id="{C259888F-61B1-5C65-AB77-2C24999D0100}"/>
-              </a:ext>
-            </a:extLst>
-          </p:cNvPr>
-          <p:cNvSpPr/>
-          <p:nvPr/>
-        </p:nvSpPr>
-        <p:spPr>
-          <a:xfrm>
-            <a:off x="1292167" y="3716573"/>
-            <a:ext cx="1498059" cy="583660"/>
-          </a:xfrm>
-          <a:prstGeom prst="roundRect">
-            <a:avLst/>
-          </a:prstGeom>
-          <a:solidFill>
-            <a:srgbClr val="FFFF00"/>
-          </a:solidFill>
-          <a:ln>
-            <a:noFill/>
-          </a:ln>
-        </p:spPr>
-        <p:style>
-          <a:lnRef idx="2">
-            <a:schemeClr val="accent2">
-              <a:shade val="15000"/>
-            </a:schemeClr>
-          </a:lnRef>
-          <a:fillRef idx="1">
-            <a:schemeClr val="accent2"/>
-          </a:fillRef>
-          <a:effectRef idx="0">
-            <a:schemeClr val="accent2"/>
-          </a:effectRef>
-          <a:fontRef idx="minor">
-            <a:schemeClr val="lt1"/>
-          </a:fontRef>
-        </p:style>
-        <p:txBody>
-          <a:bodyPr rtlCol="0" anchor="ctr"/>
-          <a:lstStyle/>
-          <a:p>
-            <a:pPr algn="ctr"/>
-            <a:r>
-              <a:rPr lang="pt-BR" b="1" dirty="0">
-                <a:solidFill>
-                  <a:srgbClr val="02082C"/>
-                </a:solidFill>
-              </a:rPr>
-              <a:t>Método</a:t>
-            </a:r>
-          </a:p>
-        </p:txBody>
-      </p:sp>
-      <p:sp>
-        <p:nvSpPr>
-          <p:cNvPr id="11" name="Rectangle: Rounded Corners 10">
-            <a:extLst>
-              <a:ext uri="{FF2B5EF4-FFF2-40B4-BE49-F238E27FC236}">
-                <a16:creationId xmlns:a16="http://schemas.microsoft.com/office/drawing/2014/main" id="{A2498384-ABAA-3D7C-D3AC-4FC171975C6E}"/>
-              </a:ext>
-            </a:extLst>
-          </p:cNvPr>
-          <p:cNvSpPr/>
-          <p:nvPr/>
-        </p:nvSpPr>
-        <p:spPr>
-          <a:xfrm>
-            <a:off x="5162144" y="1222991"/>
-            <a:ext cx="1867712" cy="583660"/>
-          </a:xfrm>
-          <a:prstGeom prst="roundRect">
-            <a:avLst/>
-          </a:prstGeom>
-          <a:solidFill>
-            <a:srgbClr val="92D050"/>
-          </a:solidFill>
-          <a:ln>
-            <a:noFill/>
-          </a:ln>
-        </p:spPr>
-        <p:style>
-          <a:lnRef idx="2">
-            <a:schemeClr val="accent2">
-              <a:shade val="15000"/>
-            </a:schemeClr>
-          </a:lnRef>
-          <a:fillRef idx="1">
-            <a:schemeClr val="accent2"/>
-          </a:fillRef>
-          <a:effectRef idx="0">
-            <a:schemeClr val="accent2"/>
-          </a:effectRef>
-          <a:fontRef idx="minor">
-            <a:schemeClr val="lt1"/>
-          </a:fontRef>
-        </p:style>
-        <p:txBody>
-          <a:bodyPr rtlCol="0" anchor="ctr"/>
-          <a:lstStyle/>
-          <a:p>
-            <a:pPr algn="ctr"/>
-            <a:r>
-              <a:rPr lang="pt-BR" b="1" dirty="0">
-                <a:solidFill>
-                  <a:srgbClr val="02082C"/>
-                </a:solidFill>
-              </a:rPr>
-              <a:t>Recurso/Rota</a:t>
-            </a:r>
-          </a:p>
-        </p:txBody>
-      </p:sp>
-      <p:sp>
-        <p:nvSpPr>
-          <p:cNvPr id="12" name="Rectangle: Rounded Corners 11">
-            <a:extLst>
-              <a:ext uri="{FF2B5EF4-FFF2-40B4-BE49-F238E27FC236}">
-                <a16:creationId xmlns:a16="http://schemas.microsoft.com/office/drawing/2014/main" id="{4F4FE752-3B18-D59B-070F-8C4940D60999}"/>
-              </a:ext>
-            </a:extLst>
-          </p:cNvPr>
-          <p:cNvSpPr/>
-          <p:nvPr/>
-        </p:nvSpPr>
-        <p:spPr>
-          <a:xfrm>
-            <a:off x="8745172" y="4864208"/>
-            <a:ext cx="1867712" cy="583660"/>
-          </a:xfrm>
-          <a:prstGeom prst="roundRect">
-            <a:avLst/>
-          </a:prstGeom>
-          <a:solidFill>
-            <a:srgbClr val="FF0000"/>
-          </a:solidFill>
-          <a:ln>
-            <a:noFill/>
-          </a:ln>
-        </p:spPr>
-        <p:style>
-          <a:lnRef idx="2">
-            <a:schemeClr val="accent2">
-              <a:shade val="15000"/>
-            </a:schemeClr>
-          </a:lnRef>
-          <a:fillRef idx="1">
-            <a:schemeClr val="accent2"/>
-          </a:fillRef>
-          <a:effectRef idx="0">
-            <a:schemeClr val="accent2"/>
-          </a:effectRef>
-          <a:fontRef idx="minor">
-            <a:schemeClr val="lt1"/>
-          </a:fontRef>
-        </p:style>
-        <p:txBody>
-          <a:bodyPr rtlCol="0" anchor="ctr"/>
-          <a:lstStyle/>
-          <a:p>
-            <a:pPr algn="ctr"/>
-            <a:r>
-              <a:rPr lang="pt-BR" b="1" dirty="0">
-                <a:solidFill>
-                  <a:srgbClr val="02082C"/>
-                </a:solidFill>
-              </a:rPr>
-              <a:t>Parâmetro</a:t>
-            </a:r>
-          </a:p>
-        </p:txBody>
-      </p:sp>
-    </p:spTree>
-    <p:extLst>
-      <p:ext uri="{BB962C8B-B14F-4D97-AF65-F5344CB8AC3E}">
-        <p14:creationId xmlns:p14="http://schemas.microsoft.com/office/powerpoint/2010/main" val="3068809172"/>
-      </p:ext>
-    </p:extLst>
-  </p:cSld>
-  <p:clrMapOvr>
-    <a:masterClrMapping/>
-  </p:clrMapOvr>
-  <mc:AlternateContent xmlns:mc="http://schemas.openxmlformats.org/markup-compatibility/2006">
-    <mc:Choice xmlns:p159="http://schemas.microsoft.com/office/powerpoint/2015/09/main" Requires="p159">
-      <p:transition xmlns:p14="http://schemas.microsoft.com/office/powerpoint/2010/main" spd="slow" p14:dur="2000">
-        <p159:morph option="byObject"/>
-      </p:transition>
-    </mc:Choice>
-    <mc:Fallback>
+    <mc:Fallback xmlns="">
       <p:transition spd="slow">
         <p:fade/>
       </p:transition>
@@ -9549,13 +9575,13 @@
   <p:clrMapOvr>
     <a:masterClrMapping/>
   </p:clrMapOvr>
-  <mc:AlternateContent xmlns:mc="http://schemas.openxmlformats.org/markup-compatibility/2006">
-    <mc:Choice xmlns:p159="http://schemas.microsoft.com/office/powerpoint/2015/09/main" Requires="p159">
+  <mc:AlternateContent xmlns:mc="http://schemas.openxmlformats.org/markup-compatibility/2006" xmlns:p159="http://schemas.microsoft.com/office/powerpoint/2015/09/main">
+    <mc:Choice Requires="p159">
       <p:transition xmlns:p14="http://schemas.microsoft.com/office/powerpoint/2010/main" spd="slow" p14:dur="2000">
         <p159:morph option="byObject"/>
       </p:transition>
     </mc:Choice>
-    <mc:Fallback>
+    <mc:Fallback xmlns="">
       <p:transition spd="slow">
         <p:fade/>
       </p:transition>

</xml_diff>